<commit_message>
adding files in functions
</commit_message>
<xml_diff>
--- a/PDF Prezentacii/6.Functions.pptx
+++ b/PDF Prezentacii/6.Functions.pptx
@@ -3616,7 +3616,7 @@
           <a:p>
             <a:fld id="{39AA2A8A-917E-43FA-8D2E-45EE0056776D}" type="datetimeFigureOut">
               <a:rPr lang="en-US" smtClean="0"/>
-              <a:t>6/3/2022</a:t>
+              <a:t>6/20/2022</a:t>
             </a:fld>
             <a:endParaRPr lang="en-US"/>
           </a:p>
@@ -4147,7 +4147,7 @@
           <a:p>
             <a:fld id="{E5ABE304-FEA4-4938-A6BC-F6F5562CB43D}" type="datetimeFigureOut">
               <a:rPr lang="en-US" smtClean="0"/>
-              <a:t>6/3/2022</a:t>
+              <a:t>6/20/2022</a:t>
             </a:fld>
             <a:endParaRPr lang="en-US"/>
           </a:p>
@@ -4409,7 +4409,7 @@
           <a:p>
             <a:fld id="{E5ABE304-FEA4-4938-A6BC-F6F5562CB43D}" type="datetimeFigureOut">
               <a:rPr lang="en-US" smtClean="0"/>
-              <a:t>6/3/2022</a:t>
+              <a:t>6/20/2022</a:t>
             </a:fld>
             <a:endParaRPr lang="en-US"/>
           </a:p>
@@ -4644,7 +4644,7 @@
           <a:p>
             <a:fld id="{E5ABE304-FEA4-4938-A6BC-F6F5562CB43D}" type="datetimeFigureOut">
               <a:rPr lang="en-US" smtClean="0"/>
-              <a:t>6/3/2022</a:t>
+              <a:t>6/20/2022</a:t>
             </a:fld>
             <a:endParaRPr lang="en-US"/>
           </a:p>
@@ -4884,7 +4884,7 @@
           <a:p>
             <a:fld id="{E5ABE304-FEA4-4938-A6BC-F6F5562CB43D}" type="datetimeFigureOut">
               <a:rPr lang="en-US" smtClean="0"/>
-              <a:t>6/3/2022</a:t>
+              <a:t>6/20/2022</a:t>
             </a:fld>
             <a:endParaRPr lang="en-US"/>
           </a:p>
@@ -5191,7 +5191,7 @@
           <a:p>
             <a:fld id="{E5ABE304-FEA4-4938-A6BC-F6F5562CB43D}" type="datetimeFigureOut">
               <a:rPr lang="en-US" smtClean="0"/>
-              <a:t>6/3/2022</a:t>
+              <a:t>6/20/2022</a:t>
             </a:fld>
             <a:endParaRPr lang="en-US"/>
           </a:p>
@@ -5493,7 +5493,7 @@
           <a:p>
             <a:fld id="{E5ABE304-FEA4-4938-A6BC-F6F5562CB43D}" type="datetimeFigureOut">
               <a:rPr lang="en-US" smtClean="0"/>
-              <a:t>6/3/2022</a:t>
+              <a:t>6/20/2022</a:t>
             </a:fld>
             <a:endParaRPr lang="en-US"/>
           </a:p>
@@ -5915,7 +5915,7 @@
           <a:p>
             <a:fld id="{E5ABE304-FEA4-4938-A6BC-F6F5562CB43D}" type="datetimeFigureOut">
               <a:rPr lang="en-US" smtClean="0"/>
-              <a:t>6/3/2022</a:t>
+              <a:t>6/20/2022</a:t>
             </a:fld>
             <a:endParaRPr lang="en-US"/>
           </a:p>
@@ -6010,7 +6010,7 @@
           <a:p>
             <a:fld id="{E5ABE304-FEA4-4938-A6BC-F6F5562CB43D}" type="datetimeFigureOut">
               <a:rPr lang="en-US" smtClean="0"/>
-              <a:t>6/3/2022</a:t>
+              <a:t>6/20/2022</a:t>
             </a:fld>
             <a:endParaRPr lang="en-US"/>
           </a:p>
@@ -6172,7 +6172,7 @@
           <a:p>
             <a:fld id="{E5ABE304-FEA4-4938-A6BC-F6F5562CB43D}" type="datetimeFigureOut">
               <a:rPr lang="en-US" smtClean="0"/>
-              <a:t>6/3/2022</a:t>
+              <a:t>6/20/2022</a:t>
             </a:fld>
             <a:endParaRPr lang="en-US"/>
           </a:p>
@@ -6550,7 +6550,7 @@
           <a:p>
             <a:fld id="{E5ABE304-FEA4-4938-A6BC-F6F5562CB43D}" type="datetimeFigureOut">
               <a:rPr lang="en-US" smtClean="0"/>
-              <a:t>6/3/2022</a:t>
+              <a:t>6/20/2022</a:t>
             </a:fld>
             <a:endParaRPr lang="en-US"/>
           </a:p>
@@ -6839,7 +6839,7 @@
           <a:p>
             <a:fld id="{E5ABE304-FEA4-4938-A6BC-F6F5562CB43D}" type="datetimeFigureOut">
               <a:rPr lang="en-US" smtClean="0"/>
-              <a:t>6/3/2022</a:t>
+              <a:t>6/20/2022</a:t>
             </a:fld>
             <a:endParaRPr lang="en-US"/>
           </a:p>
@@ -7050,7 +7050,7 @@
           <a:p>
             <a:fld id="{E5ABE304-FEA4-4938-A6BC-F6F5562CB43D}" type="datetimeFigureOut">
               <a:rPr lang="en-US" smtClean="0"/>
-              <a:t>6/3/2022</a:t>
+              <a:t>6/20/2022</a:t>
             </a:fld>
             <a:endParaRPr lang="en-US"/>
           </a:p>
@@ -7683,6 +7683,10 @@
               <a:rPr lang="en-US" sz="4000" dirty="0" err="1"/>
               <a:t>JAvaScript</a:t>
             </a:r>
+            <a:r>
+              <a:rPr lang="en-US" sz="4000" dirty="0"/>
+              <a:t/>
+            </a:r>
             <a:br>
               <a:rPr lang="en-US" sz="4000" dirty="0"/>
             </a:br>
@@ -7709,7 +7713,7 @@
           <p:nvPr/>
         </p:nvPicPr>
         <p:blipFill>
-          <a:blip r:embed="rId2">
+          <a:blip r:embed="rId2" cstate="hqprint">
             <a:extLst>
               <a:ext uri="{28A0092B-C50C-407E-A947-70E740481C1C}">
                 <a14:useLocalDpi xmlns:a14="http://schemas.microsoft.com/office/drawing/2010/main" val="0"/>
@@ -8438,6 +8442,12 @@
             <a:pPr marL="0" indent="0" algn="l">
               <a:buNone/>
             </a:pPr>
+            <a:r>
+              <a:rPr lang="en-US" dirty="0">
+                <a:latin typeface="BookAntiqua"/>
+              </a:rPr>
+              <a:t/>
+            </a:r>
             <a:br>
               <a:rPr lang="en-US" dirty="0">
                 <a:latin typeface="BookAntiqua"/>
@@ -8723,6 +8733,12 @@
             <a:pPr marL="0" indent="0" algn="l">
               <a:buNone/>
             </a:pPr>
+            <a:r>
+              <a:rPr lang="en-US" dirty="0">
+                <a:latin typeface="BookAntiqua"/>
+              </a:rPr>
+              <a:t/>
+            </a:r>
             <a:br>
               <a:rPr lang="en-US" dirty="0">
                 <a:latin typeface="BookAntiqua"/>
@@ -9828,6 +9844,12 @@
             <a:pPr marL="0" indent="0" algn="l">
               <a:buNone/>
             </a:pPr>
+            <a:r>
+              <a:rPr lang="en-US" dirty="0">
+                <a:latin typeface="BookAntiqua"/>
+              </a:rPr>
+              <a:t/>
+            </a:r>
             <a:br>
               <a:rPr lang="en-US" dirty="0">
                 <a:latin typeface="BookAntiqua"/>
@@ -9852,6 +9874,12 @@
             <a:pPr marL="0" indent="0" algn="l">
               <a:buNone/>
             </a:pPr>
+            <a:r>
+              <a:rPr lang="en-US" dirty="0">
+                <a:latin typeface="BookAntiqua"/>
+              </a:rPr>
+              <a:t/>
+            </a:r>
             <a:br>
               <a:rPr lang="en-US" dirty="0">
                 <a:latin typeface="BookAntiqua"/>
@@ -10592,11 +10620,23 @@
             <a:pPr marL="0" indent="0" algn="l">
               <a:buNone/>
             </a:pPr>
+            <a:r>
+              <a:rPr lang="en-US" dirty="0">
+                <a:latin typeface="BookAntiqua"/>
+              </a:rPr>
+              <a:t/>
+            </a:r>
             <a:br>
               <a:rPr lang="en-US" dirty="0">
                 <a:latin typeface="BookAntiqua"/>
               </a:rPr>
             </a:br>
+            <a:r>
+              <a:rPr lang="en-US" dirty="0">
+                <a:latin typeface="BookAntiqua"/>
+              </a:rPr>
+              <a:t/>
+            </a:r>
             <a:br>
               <a:rPr lang="en-US" dirty="0">
                 <a:latin typeface="BookAntiqua"/>
@@ -11993,6 +12033,12 @@
             <a:pPr marL="0" indent="0" algn="l">
               <a:buNone/>
             </a:pPr>
+            <a:r>
+              <a:rPr lang="en-US" dirty="0">
+                <a:latin typeface="BookAntiqua"/>
+              </a:rPr>
+              <a:t/>
+            </a:r>
             <a:br>
               <a:rPr lang="en-US" dirty="0">
                 <a:latin typeface="BookAntiqua"/>
@@ -12368,11 +12414,23 @@
             <a:pPr marL="0" indent="0" algn="l">
               <a:buNone/>
             </a:pPr>
+            <a:r>
+              <a:rPr lang="en-US" dirty="0">
+                <a:latin typeface="BookAntiqua"/>
+              </a:rPr>
+              <a:t/>
+            </a:r>
             <a:br>
               <a:rPr lang="en-US" dirty="0">
                 <a:latin typeface="BookAntiqua"/>
               </a:rPr>
             </a:br>
+            <a:r>
+              <a:rPr lang="en-US" dirty="0">
+                <a:latin typeface="BookAntiqua"/>
+              </a:rPr>
+              <a:t/>
+            </a:r>
             <a:br>
               <a:rPr lang="en-US" dirty="0">
                 <a:latin typeface="BookAntiqua"/>
@@ -14945,6 +15003,12 @@
             <a:pPr marL="0" indent="0" algn="l">
               <a:buNone/>
             </a:pPr>
+            <a:r>
+              <a:rPr lang="en-US" dirty="0">
+                <a:latin typeface="BookAntiqua"/>
+              </a:rPr>
+              <a:t/>
+            </a:r>
             <a:br>
               <a:rPr lang="en-US" dirty="0">
                 <a:latin typeface="BookAntiqua"/>
@@ -15726,6 +15790,12 @@
             <a:pPr marL="0" indent="0" algn="l">
               <a:buNone/>
             </a:pPr>
+            <a:r>
+              <a:rPr lang="en-US" dirty="0">
+                <a:latin typeface="BookAntiqua"/>
+              </a:rPr>
+              <a:t/>
+            </a:r>
             <a:br>
               <a:rPr lang="en-US" dirty="0">
                 <a:latin typeface="BookAntiqua"/>
@@ -16628,6 +16698,12 @@
             <a:pPr marL="0" indent="0" algn="l">
               <a:buNone/>
             </a:pPr>
+            <a:r>
+              <a:rPr lang="en-US" dirty="0">
+                <a:latin typeface="BookAntiqua"/>
+              </a:rPr>
+              <a:t/>
+            </a:r>
             <a:br>
               <a:rPr lang="en-US" dirty="0">
                 <a:latin typeface="BookAntiqua"/>
@@ -17275,6 +17351,12 @@
             <a:pPr marL="0" indent="0" algn="l">
               <a:buNone/>
             </a:pPr>
+            <a:r>
+              <a:rPr lang="en-US" dirty="0">
+                <a:latin typeface="BookAntiqua"/>
+              </a:rPr>
+              <a:t/>
+            </a:r>
             <a:br>
               <a:rPr lang="en-US" dirty="0">
                 <a:latin typeface="BookAntiqua"/>
@@ -22162,6 +22244,12 @@
             <a:pPr marL="0" indent="0">
               <a:buNone/>
             </a:pPr>
+            <a:r>
+              <a:rPr lang="en-US" dirty="0">
+                <a:latin typeface="BookAntiqua"/>
+              </a:rPr>
+              <a:t/>
+            </a:r>
             <a:br>
               <a:rPr lang="en-US" dirty="0">
                 <a:latin typeface="BookAntiqua"/>
@@ -22175,6 +22263,12 @@
             <a:pPr marL="0" indent="0">
               <a:buNone/>
             </a:pPr>
+            <a:r>
+              <a:rPr lang="en-US" dirty="0">
+                <a:latin typeface="BookAntiqua"/>
+              </a:rPr>
+              <a:t/>
+            </a:r>
             <a:br>
               <a:rPr lang="en-US" dirty="0">
                 <a:latin typeface="BookAntiqua"/>
@@ -22438,6 +22532,12 @@
             <a:pPr marL="0" indent="0" algn="l">
               <a:buNone/>
             </a:pPr>
+            <a:r>
+              <a:rPr lang="en-US" dirty="0">
+                <a:latin typeface="BookAntiqua"/>
+              </a:rPr>
+              <a:t/>
+            </a:r>
             <a:br>
               <a:rPr lang="en-US" dirty="0">
                 <a:latin typeface="BookAntiqua"/>
@@ -24223,6 +24323,12 @@
             <a:pPr marL="0" indent="0" algn="l">
               <a:buNone/>
             </a:pPr>
+            <a:r>
+              <a:rPr lang="en-US" dirty="0">
+                <a:latin typeface="BookAntiqua"/>
+              </a:rPr>
+              <a:t/>
+            </a:r>
             <a:br>
               <a:rPr lang="en-US" dirty="0">
                 <a:latin typeface="BookAntiqua"/>

</xml_diff>